<commit_message>
Update Real-Time Process Monitoring Dashboard.pptx
</commit_message>
<xml_diff>
--- a/Real-Time Process Monitoring Dashboard.pptx
+++ b/Real-Time Process Monitoring Dashboard.pptx
@@ -124,6 +124,43 @@
     </p:ext>
   </p:extLst>
 </p:presentation>
+</file>
+
+<file path=ppt/revisionInfo.xml><?xml version="1.0" encoding="utf-8"?>
+<p1510:revInfo xmlns:a="http://schemas.openxmlformats.org/drawingml/2006/main" xmlns:r="http://schemas.openxmlformats.org/officeDocument/2006/relationships" xmlns:p1510="http://schemas.microsoft.com/office/powerpoint/2015/10/main">
+  <p1510:revLst>
+    <p1510:client id="{136F1914-1627-4C21-95C8-59C1C74207F2}" v="1" dt="2025-04-18T16:48:45.088"/>
+  </p1510:revLst>
+</p1510:revInfo>
+</file>
+
+<file path=ppt/changesInfos/changesInfo1.xml><?xml version="1.0" encoding="utf-8"?>
+<pc:chgInfo xmlns:a="http://schemas.openxmlformats.org/drawingml/2006/main" xmlns:r="http://schemas.openxmlformats.org/officeDocument/2006/relationships" xmlns:ac="http://schemas.microsoft.com/office/drawing/2013/main/command" xmlns:pc="http://schemas.microsoft.com/office/powerpoint/2013/main/command">
+  <pc:docChgLst>
+    <pc:chgData name="Rahul Dangi" userId="265b54473c85747e" providerId="LiveId" clId="{136F1914-1627-4C21-95C8-59C1C74207F2}"/>
+    <pc:docChg chg="modSld">
+      <pc:chgData name="Rahul Dangi" userId="265b54473c85747e" providerId="LiveId" clId="{136F1914-1627-4C21-95C8-59C1C74207F2}" dt="2025-04-18T16:47:54.957" v="68" actId="20577"/>
+      <pc:docMkLst>
+        <pc:docMk/>
+      </pc:docMkLst>
+      <pc:sldChg chg="modSp mod">
+        <pc:chgData name="Rahul Dangi" userId="265b54473c85747e" providerId="LiveId" clId="{136F1914-1627-4C21-95C8-59C1C74207F2}" dt="2025-04-18T16:47:54.957" v="68" actId="20577"/>
+        <pc:sldMkLst>
+          <pc:docMk/>
+          <pc:sldMk cId="0" sldId="256"/>
+        </pc:sldMkLst>
+        <pc:spChg chg="mod">
+          <ac:chgData name="Rahul Dangi" userId="265b54473c85747e" providerId="LiveId" clId="{136F1914-1627-4C21-95C8-59C1C74207F2}" dt="2025-04-18T16:47:54.957" v="68" actId="20577"/>
+          <ac:spMkLst>
+            <pc:docMk/>
+            <pc:sldMk cId="0" sldId="256"/>
+            <ac:spMk id="681" creationId="{00000000-0000-0000-0000-000000000000}"/>
+          </ac:spMkLst>
+        </pc:spChg>
+      </pc:sldChg>
+    </pc:docChg>
+  </pc:docChgLst>
+</pc:chgInfo>
 </file>
 
 <file path=ppt/slideLayouts/slideLayout1.xml><?xml version="1.0" encoding="utf-8"?>
@@ -7071,7 +7108,7 @@
             </a:pPr>
             <a:r>
               <a:rPr lang="en-US" sz="1100" b="1" dirty="0"/>
-              <a:t>By Vasu Rastogi, Arpit Singh, Abhishek Yadav</a:t>
+              <a:t>By Rahul , Ayan Khan, Ramit Phul</a:t>
             </a:r>
             <a:endParaRPr lang="en-US" sz="1200" b="1" dirty="0"/>
           </a:p>
@@ -27793,7 +27830,7 @@
               <a:rPr lang="en-IN" sz="2000" dirty="0">
                 <a:hlinkClick r:id="rId2"/>
               </a:rPr>
-              <a:t>https://github.com/TheVasuRastogi/Real-Time-Process-Monitoring-Dashboard</a:t>
+              <a:t>https://github.com/rahuldangi221/Real_time_monitoring</a:t>
             </a:r>
             <a:endParaRPr lang="en-IN" sz="2000" dirty="0"/>
           </a:p>

</xml_diff>